<commit_message>
Updated Week 7 Rmd with more comments
Documentation Links
</commit_message>
<xml_diff>
--- a/Week7-Model-Basics-Building/Week 7-Model Basics and Building.pptx
+++ b/Week7-Model-Basics-Building/Week 7-Model Basics and Building.pptx
@@ -7749,7 +7749,12 @@
             <p:ph type="title"/>
           </p:nvPr>
         </p:nvSpPr>
-        <p:spPr/>
+        <p:spPr>
+          <a:xfrm>
+            <a:off x="387900" y="458024"/>
+            <a:ext cx="8368200" cy="865617"/>
+          </a:xfrm>
+        </p:spPr>
         <p:txBody>
           <a:bodyPr>
             <a:normAutofit fontScale="90000"/>
@@ -7758,7 +7763,7 @@
           <a:p>
             <a:r>
               <a:rPr lang="en-US" sz="2800" dirty="0"/>
-              <a:t>1.1.1 Generalized Linear Model (Ridge, Lasso, Elastic net)</a:t>
+              <a:t>1.2.1 Generalized Linear Model (Ridge, Lasso, Elastic net)</a:t>
             </a:r>
             <a:endParaRPr lang="en-MY" dirty="0"/>
           </a:p>

</xml_diff>

<commit_message>
Updated W7 in class
</commit_message>
<xml_diff>
--- a/Week7-Model-Basics-Building/Week 7-Model Basics and Building.pptx
+++ b/Week7-Model-Basics-Building/Week 7-Model Basics and Building.pptx
@@ -9331,7 +9331,7 @@
             </a:pPr>
             <a:r>
               <a:rPr lang="en-MY" dirty="0"/>
-              <a:t>Understanding the concepts of a data Model (as Model for understanding data and interpreting data, and not in structuring data for databases) </a:t>
+              <a:t>Understanding the concepts of a Data Model (as Model for understanding data and interpreting data, and not in structuring data for databases) </a:t>
             </a:r>
           </a:p>
           <a:p>
@@ -10534,15 +10534,7 @@
             </a:pPr>
             <a:r>
               <a:rPr lang="en-US" sz="2400" dirty="0"/>
-              <a:t>1. How to properly install R, </a:t>
-            </a:r>
-            <a:r>
-              <a:rPr lang="en-US" sz="2400" dirty="0" err="1"/>
-              <a:t>Rstudio</a:t>
-            </a:r>
-            <a:r>
-              <a:rPr lang="en-US" sz="2400" dirty="0"/>
-              <a:t>, and libraries</a:t>
+              <a:t>1. How to properly install R, RStudio, and libraries</a:t>
             </a:r>
           </a:p>
           <a:p>

</xml_diff>